<commit_message>
La furia de San Julian
</commit_message>
<xml_diff>
--- a/imagenes.pptx
+++ b/imagenes.pptx
@@ -6,6 +6,8 @@
   </p:sldMasterIdLst>
   <p:sldIdLst>
     <p:sldId id="256" r:id="rId2"/>
+    <p:sldId id="258" r:id="rId3"/>
+    <p:sldId id="257" r:id="rId4"/>
   </p:sldIdLst>
   <p:sldSz cx="6858000" cy="9144000" type="letter"/>
   <p:notesSz cx="6858000" cy="9144000"/>
@@ -104,6 +106,11 @@
       </a:defRPr>
     </a:lvl9pPr>
   </p:defaultTextStyle>
+  <p:extLst>
+    <p:ext uri="{EFAFB233-063F-42B5-8137-9DF3F51BA10A}">
+      <p15:sldGuideLst xmlns:p15="http://schemas.microsoft.com/office/powerpoint/2012/main"/>
+    </p:ext>
+  </p:extLst>
 </p:presentation>
 </file>
 
@@ -238,7 +245,7 @@
           <a:p>
             <a:fld id="{3D1B762B-D13E-4A11-8340-984C55E42E44}" type="datetimeFigureOut">
               <a:rPr lang="es-ES" smtClean="0"/>
-              <a:t>27/05/2022</a:t>
+              <a:t>31/05/2022</a:t>
             </a:fld>
             <a:endParaRPr lang="es-ES"/>
           </a:p>
@@ -408,7 +415,7 @@
           <a:p>
             <a:fld id="{3D1B762B-D13E-4A11-8340-984C55E42E44}" type="datetimeFigureOut">
               <a:rPr lang="es-ES" smtClean="0"/>
-              <a:t>27/05/2022</a:t>
+              <a:t>31/05/2022</a:t>
             </a:fld>
             <a:endParaRPr lang="es-ES"/>
           </a:p>
@@ -588,7 +595,7 @@
           <a:p>
             <a:fld id="{3D1B762B-D13E-4A11-8340-984C55E42E44}" type="datetimeFigureOut">
               <a:rPr lang="es-ES" smtClean="0"/>
-              <a:t>27/05/2022</a:t>
+              <a:t>31/05/2022</a:t>
             </a:fld>
             <a:endParaRPr lang="es-ES"/>
           </a:p>
@@ -758,7 +765,7 @@
           <a:p>
             <a:fld id="{3D1B762B-D13E-4A11-8340-984C55E42E44}" type="datetimeFigureOut">
               <a:rPr lang="es-ES" smtClean="0"/>
-              <a:t>27/05/2022</a:t>
+              <a:t>31/05/2022</a:t>
             </a:fld>
             <a:endParaRPr lang="es-ES"/>
           </a:p>
@@ -1002,7 +1009,7 @@
           <a:p>
             <a:fld id="{3D1B762B-D13E-4A11-8340-984C55E42E44}" type="datetimeFigureOut">
               <a:rPr lang="es-ES" smtClean="0"/>
-              <a:t>27/05/2022</a:t>
+              <a:t>31/05/2022</a:t>
             </a:fld>
             <a:endParaRPr lang="es-ES"/>
           </a:p>
@@ -1234,7 +1241,7 @@
           <a:p>
             <a:fld id="{3D1B762B-D13E-4A11-8340-984C55E42E44}" type="datetimeFigureOut">
               <a:rPr lang="es-ES" smtClean="0"/>
-              <a:t>27/05/2022</a:t>
+              <a:t>31/05/2022</a:t>
             </a:fld>
             <a:endParaRPr lang="es-ES"/>
           </a:p>
@@ -1601,7 +1608,7 @@
           <a:p>
             <a:fld id="{3D1B762B-D13E-4A11-8340-984C55E42E44}" type="datetimeFigureOut">
               <a:rPr lang="es-ES" smtClean="0"/>
-              <a:t>27/05/2022</a:t>
+              <a:t>31/05/2022</a:t>
             </a:fld>
             <a:endParaRPr lang="es-ES"/>
           </a:p>
@@ -1719,7 +1726,7 @@
           <a:p>
             <a:fld id="{3D1B762B-D13E-4A11-8340-984C55E42E44}" type="datetimeFigureOut">
               <a:rPr lang="es-ES" smtClean="0"/>
-              <a:t>27/05/2022</a:t>
+              <a:t>31/05/2022</a:t>
             </a:fld>
             <a:endParaRPr lang="es-ES"/>
           </a:p>
@@ -1814,7 +1821,7 @@
           <a:p>
             <a:fld id="{3D1B762B-D13E-4A11-8340-984C55E42E44}" type="datetimeFigureOut">
               <a:rPr lang="es-ES" smtClean="0"/>
-              <a:t>27/05/2022</a:t>
+              <a:t>31/05/2022</a:t>
             </a:fld>
             <a:endParaRPr lang="es-ES"/>
           </a:p>
@@ -2091,7 +2098,7 @@
           <a:p>
             <a:fld id="{3D1B762B-D13E-4A11-8340-984C55E42E44}" type="datetimeFigureOut">
               <a:rPr lang="es-ES" smtClean="0"/>
-              <a:t>27/05/2022</a:t>
+              <a:t>31/05/2022</a:t>
             </a:fld>
             <a:endParaRPr lang="es-ES"/>
           </a:p>
@@ -2348,7 +2355,7 @@
           <a:p>
             <a:fld id="{3D1B762B-D13E-4A11-8340-984C55E42E44}" type="datetimeFigureOut">
               <a:rPr lang="es-ES" smtClean="0"/>
-              <a:t>27/05/2022</a:t>
+              <a:t>31/05/2022</a:t>
             </a:fld>
             <a:endParaRPr lang="es-ES"/>
           </a:p>
@@ -2561,7 +2568,7 @@
           <a:p>
             <a:fld id="{3D1B762B-D13E-4A11-8340-984C55E42E44}" type="datetimeFigureOut">
               <a:rPr lang="es-ES" smtClean="0"/>
-              <a:t>27/05/2022</a:t>
+              <a:t>31/05/2022</a:t>
             </a:fld>
             <a:endParaRPr lang="es-ES"/>
           </a:p>
@@ -2986,6 +2993,11 @@
           <a:prstGeom prst="rect">
             <a:avLst/>
           </a:prstGeom>
+          <a:solidFill>
+            <a:schemeClr val="accent1">
+              <a:lumMod val="50000"/>
+            </a:schemeClr>
+          </a:solidFill>
         </p:spPr>
         <p:style>
           <a:lnRef idx="2">
@@ -3034,8 +3046,8 @@
         </p:blipFill>
         <p:spPr>
           <a:xfrm>
-            <a:off x="0" y="3723416"/>
-            <a:ext cx="6858000" cy="4597121"/>
+            <a:off x="920931" y="4339847"/>
+            <a:ext cx="5251269" cy="3043143"/>
           </a:xfrm>
           <a:prstGeom prst="rect">
             <a:avLst/>
@@ -3074,7 +3086,7 @@
             <a:r>
               <a:rPr lang="es-VE" sz="6000" b="1" dirty="0">
                 <a:solidFill>
-                  <a:srgbClr val="002060"/>
+                  <a:schemeClr val="bg1"/>
                 </a:solidFill>
                 <a:effectLst/>
                 <a:latin typeface="Rockwell Extra Bold" panose="02060903040505020403" pitchFamily="18" charset="0"/>
@@ -3083,6 +3095,9 @@
               <a:t>La tragedia de Los Corales</a:t>
             </a:r>
             <a:endParaRPr lang="es-ES" sz="6000" b="1" dirty="0">
+              <a:solidFill>
+                <a:schemeClr val="bg1"/>
+              </a:solidFill>
               <a:effectLst/>
               <a:latin typeface="Rockwell Extra Bold" panose="02060903040505020403" pitchFamily="18" charset="0"/>
               <a:ea typeface="Times New Roman" panose="02020603050405020304" pitchFamily="18" charset="0"/>
@@ -3118,8 +3133,8 @@
         </p:blipFill>
         <p:spPr>
           <a:xfrm>
-            <a:off x="1932574" y="8465389"/>
-            <a:ext cx="2992852" cy="533757"/>
+            <a:off x="1641434" y="7944693"/>
+            <a:ext cx="3575131" cy="637603"/>
           </a:xfrm>
           <a:prstGeom prst="rect">
             <a:avLst/>
@@ -3130,6 +3145,486 @@
     <p:extLst>
       <p:ext uri="{BB962C8B-B14F-4D97-AF65-F5344CB8AC3E}">
         <p14:creationId xmlns:p14="http://schemas.microsoft.com/office/powerpoint/2010/main" val="1458229632"/>
+      </p:ext>
+    </p:extLst>
+  </p:cSld>
+  <p:clrMapOvr>
+    <a:masterClrMapping/>
+  </p:clrMapOvr>
+</p:sld>
+</file>
+
+<file path=ppt/slides/slide2.xml><?xml version="1.0" encoding="utf-8"?>
+<p:sld xmlns:a="http://schemas.openxmlformats.org/drawingml/2006/main" xmlns:r="http://schemas.openxmlformats.org/officeDocument/2006/relationships" xmlns:p="http://schemas.openxmlformats.org/presentationml/2006/main">
+  <p:cSld>
+    <p:spTree>
+      <p:nvGrpSpPr>
+        <p:cNvPr id="1" name=""/>
+        <p:cNvGrpSpPr/>
+        <p:nvPr/>
+      </p:nvGrpSpPr>
+      <p:grpSpPr>
+        <a:xfrm>
+          <a:off x="0" y="0"/>
+          <a:ext cx="0" cy="0"/>
+          <a:chOff x="0" y="0"/>
+          <a:chExt cx="0" cy="0"/>
+        </a:xfrm>
+      </p:grpSpPr>
+      <p:sp>
+        <p:nvSpPr>
+          <p:cNvPr id="4" name="Rectángulo 3">
+            <a:extLst>
+              <a:ext uri="{FF2B5EF4-FFF2-40B4-BE49-F238E27FC236}">
+                <a16:creationId xmlns:a16="http://schemas.microsoft.com/office/drawing/2014/main" id="{766A482C-6DD3-9808-FF28-4329CF613B15}"/>
+              </a:ext>
+            </a:extLst>
+          </p:cNvPr>
+          <p:cNvSpPr/>
+          <p:nvPr/>
+        </p:nvSpPr>
+        <p:spPr>
+          <a:xfrm>
+            <a:off x="0" y="0"/>
+            <a:ext cx="6858000" cy="9143999"/>
+          </a:xfrm>
+          <a:prstGeom prst="rect">
+            <a:avLst/>
+          </a:prstGeom>
+          <a:solidFill>
+            <a:schemeClr val="accent1">
+              <a:lumMod val="50000"/>
+            </a:schemeClr>
+          </a:solidFill>
+        </p:spPr>
+        <p:style>
+          <a:lnRef idx="2">
+            <a:schemeClr val="accent1">
+              <a:shade val="50000"/>
+            </a:schemeClr>
+          </a:lnRef>
+          <a:fillRef idx="1">
+            <a:schemeClr val="accent1"/>
+          </a:fillRef>
+          <a:effectRef idx="0">
+            <a:schemeClr val="accent1"/>
+          </a:effectRef>
+          <a:fontRef idx="minor">
+            <a:schemeClr val="lt1"/>
+          </a:fontRef>
+        </p:style>
+        <p:txBody>
+          <a:bodyPr rtlCol="0" anchor="ctr"/>
+          <a:lstStyle/>
+          <a:p>
+            <a:pPr algn="ctr"/>
+            <a:endParaRPr lang="es-ES"/>
+          </a:p>
+        </p:txBody>
+      </p:sp>
+      <p:pic>
+        <p:nvPicPr>
+          <p:cNvPr id="5" name="Imagen 4" descr="Logotipo&#10;&#10;Descripción generada automáticamente">
+            <a:extLst>
+              <a:ext uri="{FF2B5EF4-FFF2-40B4-BE49-F238E27FC236}">
+                <a16:creationId xmlns:a16="http://schemas.microsoft.com/office/drawing/2014/main" id="{E45555FE-6EC1-9D2B-187C-94D3BDC89EE0}"/>
+              </a:ext>
+            </a:extLst>
+          </p:cNvPr>
+          <p:cNvPicPr>
+            <a:picLocks noChangeAspect="1"/>
+          </p:cNvPicPr>
+          <p:nvPr/>
+        </p:nvPicPr>
+        <p:blipFill>
+          <a:blip r:embed="rId2">
+            <a:extLst>
+              <a:ext uri="{28A0092B-C50C-407E-A947-70E740481C1C}">
+                <a14:useLocalDpi xmlns:a14="http://schemas.microsoft.com/office/drawing/2010/main" val="0"/>
+              </a:ext>
+            </a:extLst>
+          </a:blip>
+          <a:stretch>
+            <a:fillRect/>
+          </a:stretch>
+        </p:blipFill>
+        <p:spPr>
+          <a:xfrm>
+            <a:off x="1976780" y="8245139"/>
+            <a:ext cx="2904440" cy="517989"/>
+          </a:xfrm>
+          <a:prstGeom prst="rect">
+            <a:avLst/>
+          </a:prstGeom>
+        </p:spPr>
+      </p:pic>
+      <p:pic>
+        <p:nvPicPr>
+          <p:cNvPr id="6" name="Imagen 5">
+            <a:extLst>
+              <a:ext uri="{FF2B5EF4-FFF2-40B4-BE49-F238E27FC236}">
+                <a16:creationId xmlns:a16="http://schemas.microsoft.com/office/drawing/2014/main" id="{F71CC8A8-B2C0-D857-8B36-8C02A0847457}"/>
+              </a:ext>
+            </a:extLst>
+          </p:cNvPr>
+          <p:cNvPicPr>
+            <a:picLocks noChangeAspect="1"/>
+          </p:cNvPicPr>
+          <p:nvPr/>
+        </p:nvPicPr>
+        <p:blipFill>
+          <a:blip r:embed="rId3"/>
+          <a:stretch>
+            <a:fillRect/>
+          </a:stretch>
+        </p:blipFill>
+        <p:spPr>
+          <a:xfrm>
+            <a:off x="738051" y="2976010"/>
+            <a:ext cx="5381897" cy="3823979"/>
+          </a:xfrm>
+          <a:prstGeom prst="ellipse">
+            <a:avLst/>
+          </a:prstGeom>
+          <a:ln w="47625">
+            <a:solidFill>
+              <a:schemeClr val="bg1"/>
+            </a:solidFill>
+          </a:ln>
+        </p:spPr>
+      </p:pic>
+      <p:sp>
+        <p:nvSpPr>
+          <p:cNvPr id="7" name="CuadroTexto 6">
+            <a:extLst>
+              <a:ext uri="{FF2B5EF4-FFF2-40B4-BE49-F238E27FC236}">
+                <a16:creationId xmlns:a16="http://schemas.microsoft.com/office/drawing/2014/main" id="{A4C7471D-542A-05AA-AF19-941070E86CFA}"/>
+              </a:ext>
+            </a:extLst>
+          </p:cNvPr>
+          <p:cNvSpPr txBox="1"/>
+          <p:nvPr/>
+        </p:nvSpPr>
+        <p:spPr>
+          <a:xfrm>
+            <a:off x="0" y="745904"/>
+            <a:ext cx="6858000" cy="1938992"/>
+          </a:xfrm>
+          <a:prstGeom prst="rect">
+            <a:avLst/>
+          </a:prstGeom>
+          <a:noFill/>
+        </p:spPr>
+        <p:txBody>
+          <a:bodyPr wrap="square">
+            <a:spAutoFit/>
+          </a:bodyPr>
+          <a:lstStyle/>
+          <a:p>
+            <a:pPr algn="ctr"/>
+            <a:r>
+              <a:rPr lang="es-VE" sz="6000" b="1" dirty="0">
+                <a:solidFill>
+                  <a:schemeClr val="bg1"/>
+                </a:solidFill>
+                <a:effectLst/>
+                <a:latin typeface="Rockwell Extra Bold" panose="02060903040505020403" pitchFamily="18" charset="0"/>
+                <a:ea typeface="Times New Roman" panose="02020603050405020304" pitchFamily="18" charset="0"/>
+              </a:rPr>
+              <a:t>La furia de San Julián</a:t>
+            </a:r>
+            <a:endParaRPr lang="es-ES" sz="6000" b="1" dirty="0">
+              <a:solidFill>
+                <a:schemeClr val="bg1"/>
+              </a:solidFill>
+              <a:effectLst/>
+              <a:latin typeface="Rockwell Extra Bold" panose="02060903040505020403" pitchFamily="18" charset="0"/>
+              <a:ea typeface="Times New Roman" panose="02020603050405020304" pitchFamily="18" charset="0"/>
+            </a:endParaRPr>
+          </a:p>
+        </p:txBody>
+      </p:sp>
+      <p:sp>
+        <p:nvSpPr>
+          <p:cNvPr id="8" name="CuadroTexto 7">
+            <a:extLst>
+              <a:ext uri="{FF2B5EF4-FFF2-40B4-BE49-F238E27FC236}">
+                <a16:creationId xmlns:a16="http://schemas.microsoft.com/office/drawing/2014/main" id="{1B75400A-0E64-AD27-AE4A-FC9DD9FA3568}"/>
+              </a:ext>
+            </a:extLst>
+          </p:cNvPr>
+          <p:cNvSpPr txBox="1"/>
+          <p:nvPr/>
+        </p:nvSpPr>
+        <p:spPr>
+          <a:xfrm>
+            <a:off x="0" y="7382217"/>
+            <a:ext cx="6858000" cy="584775"/>
+          </a:xfrm>
+          <a:prstGeom prst="rect">
+            <a:avLst/>
+          </a:prstGeom>
+          <a:noFill/>
+        </p:spPr>
+        <p:txBody>
+          <a:bodyPr wrap="square">
+            <a:spAutoFit/>
+          </a:bodyPr>
+          <a:lstStyle/>
+          <a:p>
+            <a:pPr algn="ctr"/>
+            <a:r>
+              <a:rPr lang="es-VE" sz="3200" b="1" dirty="0">
+                <a:solidFill>
+                  <a:schemeClr val="bg1"/>
+                </a:solidFill>
+                <a:effectLst/>
+                <a:latin typeface="Rockwell Extra Bold" panose="02060903040505020403" pitchFamily="18" charset="0"/>
+                <a:ea typeface="Times New Roman" panose="02020603050405020304" pitchFamily="18" charset="0"/>
+              </a:rPr>
+              <a:t>Pedro J. </a:t>
+            </a:r>
+            <a:r>
+              <a:rPr lang="es-VE" sz="3200" b="1" dirty="0" err="1">
+                <a:solidFill>
+                  <a:schemeClr val="bg1"/>
+                </a:solidFill>
+                <a:effectLst/>
+                <a:latin typeface="Rockwell Extra Bold" panose="02060903040505020403" pitchFamily="18" charset="0"/>
+                <a:ea typeface="Times New Roman" panose="02020603050405020304" pitchFamily="18" charset="0"/>
+              </a:rPr>
+              <a:t>Bazó</a:t>
+            </a:r>
+            <a:endParaRPr lang="es-ES" sz="3200" b="1" dirty="0">
+              <a:solidFill>
+                <a:schemeClr val="bg1"/>
+              </a:solidFill>
+              <a:effectLst/>
+              <a:latin typeface="Rockwell Extra Bold" panose="02060903040505020403" pitchFamily="18" charset="0"/>
+              <a:ea typeface="Times New Roman" panose="02020603050405020304" pitchFamily="18" charset="0"/>
+            </a:endParaRPr>
+          </a:p>
+        </p:txBody>
+      </p:sp>
+    </p:spTree>
+    <p:extLst>
+      <p:ext uri="{BB962C8B-B14F-4D97-AF65-F5344CB8AC3E}">
+        <p14:creationId xmlns:p14="http://schemas.microsoft.com/office/powerpoint/2010/main" val="4171066141"/>
+      </p:ext>
+    </p:extLst>
+  </p:cSld>
+  <p:clrMapOvr>
+    <a:masterClrMapping/>
+  </p:clrMapOvr>
+</p:sld>
+</file>
+
+<file path=ppt/slides/slide3.xml><?xml version="1.0" encoding="utf-8"?>
+<p:sld xmlns:a="http://schemas.openxmlformats.org/drawingml/2006/main" xmlns:r="http://schemas.openxmlformats.org/officeDocument/2006/relationships" xmlns:p="http://schemas.openxmlformats.org/presentationml/2006/main">
+  <p:cSld>
+    <p:spTree>
+      <p:nvGrpSpPr>
+        <p:cNvPr id="1" name=""/>
+        <p:cNvGrpSpPr/>
+        <p:nvPr/>
+      </p:nvGrpSpPr>
+      <p:grpSpPr>
+        <a:xfrm>
+          <a:off x="0" y="0"/>
+          <a:ext cx="0" cy="0"/>
+          <a:chOff x="0" y="0"/>
+          <a:chExt cx="0" cy="0"/>
+        </a:xfrm>
+      </p:grpSpPr>
+      <p:sp>
+        <p:nvSpPr>
+          <p:cNvPr id="4" name="Rectángulo 3">
+            <a:extLst>
+              <a:ext uri="{FF2B5EF4-FFF2-40B4-BE49-F238E27FC236}">
+                <a16:creationId xmlns:a16="http://schemas.microsoft.com/office/drawing/2014/main" id="{07D31F36-6FAD-2E74-CBD4-19C58C88A2BE}"/>
+              </a:ext>
+            </a:extLst>
+          </p:cNvPr>
+          <p:cNvSpPr/>
+          <p:nvPr/>
+        </p:nvSpPr>
+        <p:spPr>
+          <a:xfrm>
+            <a:off x="0" y="0"/>
+            <a:ext cx="6858000" cy="9143999"/>
+          </a:xfrm>
+          <a:prstGeom prst="rect">
+            <a:avLst/>
+          </a:prstGeom>
+          <a:solidFill>
+            <a:schemeClr val="accent1">
+              <a:lumMod val="50000"/>
+            </a:schemeClr>
+          </a:solidFill>
+        </p:spPr>
+        <p:style>
+          <a:lnRef idx="2">
+            <a:schemeClr val="accent1">
+              <a:shade val="50000"/>
+            </a:schemeClr>
+          </a:lnRef>
+          <a:fillRef idx="1">
+            <a:schemeClr val="accent1"/>
+          </a:fillRef>
+          <a:effectRef idx="0">
+            <a:schemeClr val="accent1"/>
+          </a:effectRef>
+          <a:fontRef idx="minor">
+            <a:schemeClr val="lt1"/>
+          </a:fontRef>
+        </p:style>
+        <p:txBody>
+          <a:bodyPr rtlCol="0" anchor="ctr"/>
+          <a:lstStyle/>
+          <a:p>
+            <a:pPr algn="ctr"/>
+            <a:endParaRPr lang="es-ES"/>
+          </a:p>
+        </p:txBody>
+      </p:sp>
+      <p:sp>
+        <p:nvSpPr>
+          <p:cNvPr id="5" name="CuadroTexto 4">
+            <a:extLst>
+              <a:ext uri="{FF2B5EF4-FFF2-40B4-BE49-F238E27FC236}">
+                <a16:creationId xmlns:a16="http://schemas.microsoft.com/office/drawing/2014/main" id="{6EAF2DCF-90FB-49CD-DFFE-CC75D6818467}"/>
+              </a:ext>
+            </a:extLst>
+          </p:cNvPr>
+          <p:cNvSpPr txBox="1"/>
+          <p:nvPr/>
+        </p:nvSpPr>
+        <p:spPr>
+          <a:xfrm>
+            <a:off x="0" y="1175125"/>
+            <a:ext cx="6858000" cy="1015663"/>
+          </a:xfrm>
+          <a:prstGeom prst="rect">
+            <a:avLst/>
+          </a:prstGeom>
+          <a:noFill/>
+        </p:spPr>
+        <p:txBody>
+          <a:bodyPr wrap="square">
+            <a:spAutoFit/>
+          </a:bodyPr>
+          <a:lstStyle/>
+          <a:p>
+            <a:pPr algn="ctr"/>
+            <a:r>
+              <a:rPr lang="es-VE" sz="6000" b="1" dirty="0">
+                <a:solidFill>
+                  <a:schemeClr val="bg1"/>
+                </a:solidFill>
+                <a:effectLst/>
+                <a:latin typeface="Rockwell Extra Bold" panose="02060903040505020403" pitchFamily="18" charset="0"/>
+                <a:ea typeface="Times New Roman" panose="02020603050405020304" pitchFamily="18" charset="0"/>
+              </a:rPr>
+              <a:t>TIEMPO</a:t>
+            </a:r>
+            <a:endParaRPr lang="es-ES" sz="6000" b="1" dirty="0">
+              <a:solidFill>
+                <a:schemeClr val="bg1"/>
+              </a:solidFill>
+              <a:effectLst/>
+              <a:latin typeface="Rockwell Extra Bold" panose="02060903040505020403" pitchFamily="18" charset="0"/>
+              <a:ea typeface="Times New Roman" panose="02020603050405020304" pitchFamily="18" charset="0"/>
+            </a:endParaRPr>
+          </a:p>
+        </p:txBody>
+      </p:sp>
+      <p:pic>
+        <p:nvPicPr>
+          <p:cNvPr id="6" name="Imagen 5" descr="Logotipo&#10;&#10;Descripción generada automáticamente">
+            <a:extLst>
+              <a:ext uri="{FF2B5EF4-FFF2-40B4-BE49-F238E27FC236}">
+                <a16:creationId xmlns:a16="http://schemas.microsoft.com/office/drawing/2014/main" id="{ED5FB951-498F-7EE7-FB94-BA1210F9C433}"/>
+              </a:ext>
+            </a:extLst>
+          </p:cNvPr>
+          <p:cNvPicPr>
+            <a:picLocks noChangeAspect="1"/>
+          </p:cNvPicPr>
+          <p:nvPr/>
+        </p:nvPicPr>
+        <p:blipFill>
+          <a:blip r:embed="rId2">
+            <a:extLst>
+              <a:ext uri="{28A0092B-C50C-407E-A947-70E740481C1C}">
+                <a14:useLocalDpi xmlns:a14="http://schemas.microsoft.com/office/drawing/2010/main" val="0"/>
+              </a:ext>
+            </a:extLst>
+          </a:blip>
+          <a:stretch>
+            <a:fillRect/>
+          </a:stretch>
+        </p:blipFill>
+        <p:spPr>
+          <a:xfrm>
+            <a:off x="1641434" y="7853252"/>
+            <a:ext cx="3575131" cy="637603"/>
+          </a:xfrm>
+          <a:prstGeom prst="rect">
+            <a:avLst/>
+          </a:prstGeom>
+        </p:spPr>
+      </p:pic>
+      <p:pic>
+        <p:nvPicPr>
+          <p:cNvPr id="1026" name="Picture 2" descr="Reloj, Movimiento, Tiempo, Tiempo Indicando, Puntero">
+            <a:extLst>
+              <a:ext uri="{FF2B5EF4-FFF2-40B4-BE49-F238E27FC236}">
+                <a16:creationId xmlns:a16="http://schemas.microsoft.com/office/drawing/2014/main" id="{97255781-BDAE-EF60-B7CD-5226695F9051}"/>
+              </a:ext>
+            </a:extLst>
+          </p:cNvPr>
+          <p:cNvPicPr>
+            <a:picLocks noChangeAspect="1" noChangeArrowheads="1"/>
+          </p:cNvPicPr>
+          <p:nvPr/>
+        </p:nvPicPr>
+        <p:blipFill>
+          <a:blip r:embed="rId3">
+            <a:extLst>
+              <a:ext uri="{28A0092B-C50C-407E-A947-70E740481C1C}">
+                <a14:useLocalDpi xmlns:a14="http://schemas.microsoft.com/office/drawing/2010/main" val="0"/>
+              </a:ext>
+            </a:extLst>
+          </a:blip>
+          <a:srcRect/>
+          <a:stretch>
+            <a:fillRect/>
+          </a:stretch>
+        </p:blipFill>
+        <p:spPr bwMode="auto">
+          <a:xfrm>
+            <a:off x="0" y="2983570"/>
+            <a:ext cx="6858000" cy="4294187"/>
+          </a:xfrm>
+          <a:prstGeom prst="rect">
+            <a:avLst/>
+          </a:prstGeom>
+          <a:noFill/>
+          <a:extLst>
+            <a:ext uri="{909E8E84-426E-40DD-AFC4-6F175D3DCCD1}">
+              <a14:hiddenFill xmlns:a14="http://schemas.microsoft.com/office/drawing/2010/main">
+                <a:solidFill>
+                  <a:srgbClr val="FFFFFF"/>
+                </a:solidFill>
+              </a14:hiddenFill>
+            </a:ext>
+          </a:extLst>
+        </p:spPr>
+      </p:pic>
+    </p:spTree>
+    <p:extLst>
+      <p:ext uri="{BB962C8B-B14F-4D97-AF65-F5344CB8AC3E}">
+        <p14:creationId xmlns:p14="http://schemas.microsoft.com/office/powerpoint/2010/main" val="4071070875"/>
       </p:ext>
     </p:extLst>
   </p:cSld>

</xml_diff>